<commit_message>
Made power bi used . as a decimal separator
</commit_message>
<xml_diff>
--- a/Case Study.pptx
+++ b/Case Study.pptx
@@ -4779,7 +4779,7 @@
             <a:pPr rtl="0"/>
             <a:r>
               <a:rPr lang="en-US" dirty="0"/>
-              <a:t>I have to prepare a datafile of Pokémon from the games red, blue , </a:t>
+              <a:t>I have to prepare a datafile of Pokémon from the game's red, blue , </a:t>
             </a:r>
             <a:r>
               <a:rPr lang="en-US" dirty="0" err="1"/>
@@ -4956,7 +4956,7 @@
         </p:nvSpPr>
         <p:spPr bwMode="auto">
           <a:xfrm>
-            <a:off x="790303" y="890440"/>
+            <a:off x="816936" y="889843"/>
             <a:ext cx="6755716" cy="5078313"/>
           </a:xfrm>
           <a:prstGeom prst="rect">
@@ -5807,18 +5807,14 @@
               <a:t>,</a:t>
             </a:r>
             <a:r>
-              <a:rPr kumimoji="0" lang="da-DK" altLang="da-DK" sz="1200" b="0" i="0" u="none" strike="noStrike" cap="none" normalizeH="0" baseline="0" dirty="0">
-                <a:ln>
-                  <a:noFill/>
-                </a:ln>
+              <a:rPr lang="da-DK" altLang="da-DK" sz="1200" dirty="0">
                 <a:solidFill>
                   <a:srgbClr val="6897BB"/>
                 </a:solidFill>
-                <a:effectLst/>
-                <a:latin typeface="Arial Unicode MS" panose="020B0604020202020204" pitchFamily="34" charset="-128"/>
-                <a:ea typeface="JetBrains Mono"/>
-              </a:rPr>
-              <a:t>650</a:t>
+                <a:latin typeface="Arial Unicode MS" panose="020B0604020202020204" pitchFamily="34" charset="-128"/>
+                <a:ea typeface="JetBrains Mono"/>
+              </a:rPr>
+              <a:t>905</a:t>
             </a:r>
             <a:r>
               <a:rPr kumimoji="0" lang="da-DK" altLang="da-DK" sz="1200" b="0" i="0" u="none" strike="noStrike" cap="none" normalizeH="0" baseline="0" dirty="0">

</xml_diff>